<commit_message>
Revert "Adding data files for R"
</commit_message>
<xml_diff>
--- a/01-terminal/ScienceCloud.pptx
+++ b/01-terminal/ScienceCloud.pptx
@@ -114,11 +114,6 @@
       </a:defRPr>
     </a:lvl9pPr>
   </p:defaultTextStyle>
-  <p:extLst>
-    <p:ext uri="{EFAFB233-063F-42B5-8137-9DF3F51BA10A}">
-      <p15:sldGuideLst xmlns:p15="http://schemas.microsoft.com/office/powerpoint/2012/main"/>
-    </p:ext>
-  </p:extLst>
 </p:presentation>
 </file>
 
@@ -271,7 +266,7 @@
           <a:p>
             <a:fld id="{331A492B-FC9F-294F-A4AD-26E45947B24F}" type="datetimeFigureOut">
               <a:rPr lang="en-CH" smtClean="0"/>
-              <a:t>21.08.2024</a:t>
+              <a:t>23.08.23</a:t>
             </a:fld>
             <a:endParaRPr lang="en-CH"/>
           </a:p>
@@ -471,7 +466,7 @@
           <a:p>
             <a:fld id="{331A492B-FC9F-294F-A4AD-26E45947B24F}" type="datetimeFigureOut">
               <a:rPr lang="en-CH" smtClean="0"/>
-              <a:t>21.08.2024</a:t>
+              <a:t>23.08.23</a:t>
             </a:fld>
             <a:endParaRPr lang="en-CH"/>
           </a:p>
@@ -681,7 +676,7 @@
           <a:p>
             <a:fld id="{331A492B-FC9F-294F-A4AD-26E45947B24F}" type="datetimeFigureOut">
               <a:rPr lang="en-CH" smtClean="0"/>
-              <a:t>21.08.2024</a:t>
+              <a:t>23.08.23</a:t>
             </a:fld>
             <a:endParaRPr lang="en-CH"/>
           </a:p>
@@ -881,7 +876,7 @@
           <a:p>
             <a:fld id="{331A492B-FC9F-294F-A4AD-26E45947B24F}" type="datetimeFigureOut">
               <a:rPr lang="en-CH" smtClean="0"/>
-              <a:t>21.08.2024</a:t>
+              <a:t>23.08.23</a:t>
             </a:fld>
             <a:endParaRPr lang="en-CH"/>
           </a:p>
@@ -1157,7 +1152,7 @@
           <a:p>
             <a:fld id="{331A492B-FC9F-294F-A4AD-26E45947B24F}" type="datetimeFigureOut">
               <a:rPr lang="en-CH" smtClean="0"/>
-              <a:t>21.08.2024</a:t>
+              <a:t>23.08.23</a:t>
             </a:fld>
             <a:endParaRPr lang="en-CH"/>
           </a:p>
@@ -1425,7 +1420,7 @@
           <a:p>
             <a:fld id="{331A492B-FC9F-294F-A4AD-26E45947B24F}" type="datetimeFigureOut">
               <a:rPr lang="en-CH" smtClean="0"/>
-              <a:t>21.08.2024</a:t>
+              <a:t>23.08.23</a:t>
             </a:fld>
             <a:endParaRPr lang="en-CH"/>
           </a:p>
@@ -1840,7 +1835,7 @@
           <a:p>
             <a:fld id="{331A492B-FC9F-294F-A4AD-26E45947B24F}" type="datetimeFigureOut">
               <a:rPr lang="en-CH" smtClean="0"/>
-              <a:t>21.08.2024</a:t>
+              <a:t>23.08.23</a:t>
             </a:fld>
             <a:endParaRPr lang="en-CH"/>
           </a:p>
@@ -1982,7 +1977,7 @@
           <a:p>
             <a:fld id="{331A492B-FC9F-294F-A4AD-26E45947B24F}" type="datetimeFigureOut">
               <a:rPr lang="en-CH" smtClean="0"/>
-              <a:t>21.08.2024</a:t>
+              <a:t>23.08.23</a:t>
             </a:fld>
             <a:endParaRPr lang="en-CH"/>
           </a:p>
@@ -2095,7 +2090,7 @@
           <a:p>
             <a:fld id="{331A492B-FC9F-294F-A4AD-26E45947B24F}" type="datetimeFigureOut">
               <a:rPr lang="en-CH" smtClean="0"/>
-              <a:t>21.08.2024</a:t>
+              <a:t>23.08.23</a:t>
             </a:fld>
             <a:endParaRPr lang="en-CH"/>
           </a:p>
@@ -2408,7 +2403,7 @@
           <a:p>
             <a:fld id="{331A492B-FC9F-294F-A4AD-26E45947B24F}" type="datetimeFigureOut">
               <a:rPr lang="en-CH" smtClean="0"/>
-              <a:t>21.08.2024</a:t>
+              <a:t>23.08.23</a:t>
             </a:fld>
             <a:endParaRPr lang="en-CH"/>
           </a:p>
@@ -2697,7 +2692,7 @@
           <a:p>
             <a:fld id="{331A492B-FC9F-294F-A4AD-26E45947B24F}" type="datetimeFigureOut">
               <a:rPr lang="en-CH" smtClean="0"/>
-              <a:t>21.08.2024</a:t>
+              <a:t>23.08.23</a:t>
             </a:fld>
             <a:endParaRPr lang="en-CH"/>
           </a:p>
@@ -2940,7 +2935,7 @@
           <a:p>
             <a:fld id="{331A492B-FC9F-294F-A4AD-26E45947B24F}" type="datetimeFigureOut">
               <a:rPr lang="en-CH" smtClean="0"/>
-              <a:t>21.08.2024</a:t>
+              <a:t>23.08.23</a:t>
             </a:fld>
             <a:endParaRPr lang="en-CH"/>
           </a:p>
@@ -4412,7 +4407,21 @@
                 <a:latin typeface="Courier New" panose="02070309020205020404" pitchFamily="49" charset="0"/>
                 <a:cs typeface="Courier New" panose="02070309020205020404" pitchFamily="49" charset="0"/>
               </a:rPr>
-              <a:t>cat ~/.ssh/</a:t>
+              <a:t>cat ~/.</a:t>
+            </a:r>
+            <a:r>
+              <a:rPr lang="en-GB" sz="2400" i="1" dirty="0" err="1">
+                <a:latin typeface="Courier New" panose="02070309020205020404" pitchFamily="49" charset="0"/>
+                <a:cs typeface="Courier New" panose="02070309020205020404" pitchFamily="49" charset="0"/>
+              </a:rPr>
+              <a:t>ssh</a:t>
+            </a:r>
+            <a:r>
+              <a:rPr lang="en-GB" sz="2400" i="1" dirty="0">
+                <a:latin typeface="Courier New" panose="02070309020205020404" pitchFamily="49" charset="0"/>
+                <a:cs typeface="Courier New" panose="02070309020205020404" pitchFamily="49" charset="0"/>
+              </a:rPr>
+              <a:t>/</a:t>
             </a:r>
             <a:r>
               <a:rPr lang="en-GB" sz="2400" i="1" dirty="0" err="1">
@@ -4453,19 +4462,36 @@
                 <a:latin typeface="Courier New" panose="02070309020205020404" pitchFamily="49" charset="0"/>
                 <a:cs typeface="Courier New" panose="02070309020205020404" pitchFamily="49" charset="0"/>
               </a:rPr>
-              <a:t>/.ssh/</a:t>
+              <a:t>/.</a:t>
             </a:r>
             <a:r>
               <a:rPr lang="en-GB" sz="2400" i="1" dirty="0" err="1">
                 <a:latin typeface="Courier New" panose="02070309020205020404" pitchFamily="49" charset="0"/>
                 <a:cs typeface="Courier New" panose="02070309020205020404" pitchFamily="49" charset="0"/>
               </a:rPr>
-              <a:t>id_rsa.pub</a:t>
-            </a:r>
-            <a:endParaRPr lang="en-GB" sz="2400" i="1" dirty="0">
-              <a:latin typeface="Courier New" panose="02070309020205020404" pitchFamily="49" charset="0"/>
-              <a:cs typeface="Courier New" panose="02070309020205020404" pitchFamily="49" charset="0"/>
-            </a:endParaRPr>
+              <a:t>ssh</a:t>
+            </a:r>
+            <a:r>
+              <a:rPr lang="en-GB" sz="2400" i="1" dirty="0">
+                <a:latin typeface="Courier New" panose="02070309020205020404" pitchFamily="49" charset="0"/>
+                <a:cs typeface="Courier New" panose="02070309020205020404" pitchFamily="49" charset="0"/>
+              </a:rPr>
+              <a:t>/</a:t>
+            </a:r>
+            <a:r>
+              <a:rPr lang="en-GB" sz="2400" i="1" dirty="0" err="1">
+                <a:latin typeface="Courier New" panose="02070309020205020404" pitchFamily="49" charset="0"/>
+                <a:cs typeface="Courier New" panose="02070309020205020404" pitchFamily="49" charset="0"/>
+              </a:rPr>
+              <a:t>id_rsa</a:t>
+            </a:r>
+            <a:r>
+              <a:rPr lang="en-GB" sz="2400" i="1" dirty="0">
+                <a:latin typeface="Courier New" panose="02070309020205020404" pitchFamily="49" charset="0"/>
+                <a:cs typeface="Courier New" panose="02070309020205020404" pitchFamily="49" charset="0"/>
+              </a:rPr>
+              <a:t>/pub</a:t>
+            </a:r>
           </a:p>
           <a:p>
             <a:pPr marL="571500" indent="-571500">

</xml_diff>